<commit_message>
Escrevendo a pauta e atualizando os slides
</commit_message>
<xml_diff>
--- a/Aulas/14-08-2017/Apresentacao do Curso - Tecnico em Informatica.pptx
+++ b/Aulas/14-08-2017/Apresentacao do Curso - Tecnico em Informatica.pptx
@@ -5,14 +5,15 @@
     <p:sldMasterId id="2147483648" r:id="rId1"/>
   </p:sldMasterIdLst>
   <p:notesMasterIdLst>
-    <p:notesMasterId r:id="rId7"/>
+    <p:notesMasterId r:id="rId8"/>
   </p:notesMasterIdLst>
   <p:sldIdLst>
     <p:sldId id="256" r:id="rId2"/>
     <p:sldId id="257" r:id="rId3"/>
     <p:sldId id="258" r:id="rId4"/>
-    <p:sldId id="260" r:id="rId5"/>
-    <p:sldId id="259" r:id="rId6"/>
+    <p:sldId id="261" r:id="rId5"/>
+    <p:sldId id="262" r:id="rId6"/>
+    <p:sldId id="259" r:id="rId7"/>
   </p:sldIdLst>
   <p:sldSz cx="12192000" cy="6858000"/>
   <p:notesSz cx="6858000" cy="9144000"/>
@@ -131,6 +132,10 @@
 </p:cmAuthorLst>
 </file>
 
+<file path=ppt/revisionInfo.xml><?xml version="1.0" encoding="utf-8"?>
+<p1510:revInfo xmlns:a="http://schemas.openxmlformats.org/drawingml/2006/main" xmlns:r="http://schemas.openxmlformats.org/officeDocument/2006/relationships" xmlns:p1510="http://schemas.microsoft.com/office/powerpoint/2015/10/main"/>
+</file>
+
 <file path=ppt/comments/comment1.xml><?xml version="1.0" encoding="utf-8"?>
 <p:cmLst xmlns:a="http://schemas.openxmlformats.org/drawingml/2006/main" xmlns:r="http://schemas.openxmlformats.org/officeDocument/2006/relationships" xmlns:p="http://schemas.openxmlformats.org/presentationml/2006/main">
   <p:cm authorId="1" dt="2017-07-03T21:02:19.775" idx="1">
@@ -492,90 +497,6 @@
     </a:lvl9pPr>
   </p:notesStyle>
 </p:notesMaster>
-</file>
-
-<file path=ppt/notesSlides/notesSlide1.xml><?xml version="1.0" encoding="utf-8"?>
-<p:notes xmlns:a="http://schemas.openxmlformats.org/drawingml/2006/main" xmlns:r="http://schemas.openxmlformats.org/officeDocument/2006/relationships" xmlns:p="http://schemas.openxmlformats.org/presentationml/2006/main">
-  <p:cSld>
-    <p:spTree>
-      <p:nvGrpSpPr>
-        <p:cNvPr id="1" name=""/>
-        <p:cNvGrpSpPr/>
-        <p:nvPr/>
-      </p:nvGrpSpPr>
-      <p:grpSpPr>
-        <a:xfrm>
-          <a:off x="0" y="0"/>
-          <a:ext cx="0" cy="0"/>
-          <a:chOff x="0" y="0"/>
-          <a:chExt cx="0" cy="0"/>
-        </a:xfrm>
-      </p:grpSpPr>
-      <p:sp>
-        <p:nvSpPr>
-          <p:cNvPr id="2" name="Espaço Reservado para Imagem de Slide 1"/>
-          <p:cNvSpPr>
-            <a:spLocks noGrp="1" noRot="1" noChangeAspect="1"/>
-          </p:cNvSpPr>
-          <p:nvPr>
-            <p:ph type="sldImg"/>
-          </p:nvPr>
-        </p:nvSpPr>
-        <p:spPr/>
-      </p:sp>
-      <p:sp>
-        <p:nvSpPr>
-          <p:cNvPr id="3" name="Espaço Reservado para Anotações 2"/>
-          <p:cNvSpPr>
-            <a:spLocks noGrp="1"/>
-          </p:cNvSpPr>
-          <p:nvPr>
-            <p:ph type="body" idx="1"/>
-          </p:nvPr>
-        </p:nvSpPr>
-        <p:spPr/>
-        <p:txBody>
-          <a:bodyPr/>
-          <a:lstStyle/>
-          <a:p>
-            <a:endParaRPr lang="pt-BR" dirty="0"/>
-          </a:p>
-        </p:txBody>
-      </p:sp>
-      <p:sp>
-        <p:nvSpPr>
-          <p:cNvPr id="4" name="Espaço Reservado para Número de Slide 3"/>
-          <p:cNvSpPr>
-            <a:spLocks noGrp="1"/>
-          </p:cNvSpPr>
-          <p:nvPr>
-            <p:ph type="sldNum" sz="quarter" idx="10"/>
-          </p:nvPr>
-        </p:nvSpPr>
-        <p:spPr/>
-        <p:txBody>
-          <a:bodyPr/>
-          <a:lstStyle/>
-          <a:p>
-            <a:fld id="{17D8A587-5FF7-4FFB-8B9A-90B006B16C10}" type="slidenum">
-              <a:rPr lang="pt-BR" smtClean="0"/>
-              <a:t>4</a:t>
-            </a:fld>
-            <a:endParaRPr lang="pt-BR" dirty="0"/>
-          </a:p>
-        </p:txBody>
-      </p:sp>
-    </p:spTree>
-    <p:extLst>
-      <p:ext uri="{BB962C8B-B14F-4D97-AF65-F5344CB8AC3E}">
-        <p14:creationId xmlns:p14="http://schemas.microsoft.com/office/powerpoint/2010/main" val="2313156622"/>
-      </p:ext>
-    </p:extLst>
-  </p:cSld>
-  <p:clrMapOvr>
-    <a:masterClrMapping/>
-  </p:clrMapOvr>
-</p:notes>
 </file>
 
 <file path=ppt/slideLayouts/slideLayout1.xml><?xml version="1.0" encoding="utf-8"?>
@@ -4461,6 +4382,391 @@
 <file path=ppt/slides/slide4.xml><?xml version="1.0" encoding="utf-8"?>
 <p:sld xmlns:a="http://schemas.openxmlformats.org/drawingml/2006/main" xmlns:r="http://schemas.openxmlformats.org/officeDocument/2006/relationships" xmlns:p="http://schemas.openxmlformats.org/presentationml/2006/main">
   <p:cSld>
+    <p:spTree>
+      <p:nvGrpSpPr>
+        <p:cNvPr id="1" name=""/>
+        <p:cNvGrpSpPr/>
+        <p:nvPr/>
+      </p:nvGrpSpPr>
+      <p:grpSpPr>
+        <a:xfrm>
+          <a:off x="0" y="0"/>
+          <a:ext cx="0" cy="0"/>
+          <a:chOff x="0" y="0"/>
+          <a:chExt cx="0" cy="0"/>
+        </a:xfrm>
+      </p:grpSpPr>
+      <p:pic>
+        <p:nvPicPr>
+          <p:cNvPr id="1026" name="Picture 2" descr="Resultado de imagem para flat wallpaper">
+            <a:extLst>
+              <a:ext uri="{FF2B5EF4-FFF2-40B4-BE49-F238E27FC236}">
+                <a16:creationId xmlns:a16="http://schemas.microsoft.com/office/drawing/2014/main" id="{C8379A02-ACA9-45F3-AA54-E879A2A76C70}"/>
+              </a:ext>
+            </a:extLst>
+          </p:cNvPr>
+          <p:cNvPicPr>
+            <a:picLocks noChangeAspect="1" noChangeArrowheads="1"/>
+          </p:cNvPicPr>
+          <p:nvPr/>
+        </p:nvPicPr>
+        <p:blipFill>
+          <a:blip r:embed="rId2">
+            <a:extLst>
+              <a:ext uri="{28A0092B-C50C-407E-A947-70E740481C1C}">
+                <a14:useLocalDpi xmlns:a14="http://schemas.microsoft.com/office/drawing/2010/main" val="0"/>
+              </a:ext>
+            </a:extLst>
+          </a:blip>
+          <a:srcRect/>
+          <a:stretch>
+            <a:fillRect/>
+          </a:stretch>
+        </p:blipFill>
+        <p:spPr bwMode="auto">
+          <a:xfrm>
+            <a:off x="0" y="0"/>
+            <a:ext cx="12192000" cy="6858000"/>
+          </a:xfrm>
+          <a:prstGeom prst="rect">
+            <a:avLst/>
+          </a:prstGeom>
+          <a:noFill/>
+          <a:extLst>
+            <a:ext uri="{909E8E84-426E-40DD-AFC4-6F175D3DCCD1}">
+              <a14:hiddenFill xmlns:a14="http://schemas.microsoft.com/office/drawing/2010/main">
+                <a:solidFill>
+                  <a:srgbClr val="FFFFFF"/>
+                </a:solidFill>
+              </a14:hiddenFill>
+            </a:ext>
+          </a:extLst>
+        </p:spPr>
+      </p:pic>
+      <p:sp>
+        <p:nvSpPr>
+          <p:cNvPr id="2" name="CaixaDeTexto 1">
+            <a:extLst>
+              <a:ext uri="{FF2B5EF4-FFF2-40B4-BE49-F238E27FC236}">
+                <a16:creationId xmlns:a16="http://schemas.microsoft.com/office/drawing/2014/main" id="{4EFD29F3-26D5-4A3B-B5A4-789358D24421}"/>
+              </a:ext>
+            </a:extLst>
+          </p:cNvPr>
+          <p:cNvSpPr txBox="1"/>
+          <p:nvPr/>
+        </p:nvSpPr>
+        <p:spPr>
+          <a:xfrm>
+            <a:off x="1287261" y="834501"/>
+            <a:ext cx="6022803" cy="923330"/>
+          </a:xfrm>
+          <a:prstGeom prst="rect">
+            <a:avLst/>
+          </a:prstGeom>
+          <a:noFill/>
+        </p:spPr>
+        <p:txBody>
+          <a:bodyPr wrap="none" rtlCol="0">
+            <a:spAutoFit/>
+          </a:bodyPr>
+          <a:lstStyle/>
+          <a:p>
+            <a:r>
+              <a:rPr lang="pt-BR" sz="5400" dirty="0">
+                <a:solidFill>
+                  <a:schemeClr val="bg1"/>
+                </a:solidFill>
+                <a:latin typeface="Century Gothic" panose="020B0502020202020204" pitchFamily="34" charset="0"/>
+              </a:rPr>
+              <a:t>Vamos conversar</a:t>
+            </a:r>
+          </a:p>
+        </p:txBody>
+      </p:sp>
+      <p:sp>
+        <p:nvSpPr>
+          <p:cNvPr id="3" name="Retângulo 2">
+            <a:extLst>
+              <a:ext uri="{FF2B5EF4-FFF2-40B4-BE49-F238E27FC236}">
+                <a16:creationId xmlns:a16="http://schemas.microsoft.com/office/drawing/2014/main" id="{2054C7F5-0CE0-4711-BF28-D476B0377175}"/>
+              </a:ext>
+            </a:extLst>
+          </p:cNvPr>
+          <p:cNvSpPr/>
+          <p:nvPr/>
+        </p:nvSpPr>
+        <p:spPr>
+          <a:xfrm>
+            <a:off x="127247" y="5918265"/>
+            <a:ext cx="3352800" cy="646331"/>
+          </a:xfrm>
+          <a:prstGeom prst="rect">
+            <a:avLst/>
+          </a:prstGeom>
+        </p:spPr>
+        <p:txBody>
+          <a:bodyPr wrap="square">
+            <a:spAutoFit/>
+          </a:bodyPr>
+          <a:lstStyle/>
+          <a:p>
+            <a:r>
+              <a:rPr lang="pt-BR" dirty="0">
+                <a:solidFill>
+                  <a:schemeClr val="bg1"/>
+                </a:solidFill>
+                <a:effectLst>
+                  <a:outerShdw blurRad="38100" dist="38100" dir="2700000" algn="tl">
+                    <a:srgbClr val="000000">
+                      <a:alpha val="43137"/>
+                    </a:srgbClr>
+                  </a:outerShdw>
+                </a:effectLst>
+                <a:latin typeface="Century Gothic" panose="020B0502020202020204" pitchFamily="34" charset="0"/>
+              </a:rPr>
+              <a:t>Qual seu nome?</a:t>
+            </a:r>
+          </a:p>
+          <a:p>
+            <a:r>
+              <a:rPr lang="pt-BR" dirty="0">
+                <a:solidFill>
+                  <a:schemeClr val="bg1"/>
+                </a:solidFill>
+                <a:effectLst>
+                  <a:outerShdw blurRad="38100" dist="38100" dir="2700000" algn="tl">
+                    <a:srgbClr val="000000">
+                      <a:alpha val="43137"/>
+                    </a:srgbClr>
+                  </a:outerShdw>
+                </a:effectLst>
+                <a:latin typeface="Century Gothic" panose="020B0502020202020204" pitchFamily="34" charset="0"/>
+              </a:rPr>
+              <a:t>Quais são seus hobbies?</a:t>
+            </a:r>
+          </a:p>
+        </p:txBody>
+      </p:sp>
+      <p:sp>
+        <p:nvSpPr>
+          <p:cNvPr id="4" name="Retângulo 3">
+            <a:extLst>
+              <a:ext uri="{FF2B5EF4-FFF2-40B4-BE49-F238E27FC236}">
+                <a16:creationId xmlns:a16="http://schemas.microsoft.com/office/drawing/2014/main" id="{C7525EF9-EFD7-45EC-AF22-A69394EA8E5F}"/>
+              </a:ext>
+            </a:extLst>
+          </p:cNvPr>
+          <p:cNvSpPr/>
+          <p:nvPr/>
+        </p:nvSpPr>
+        <p:spPr>
+          <a:xfrm>
+            <a:off x="7105095" y="5918265"/>
+            <a:ext cx="5004047" cy="646331"/>
+          </a:xfrm>
+          <a:prstGeom prst="rect">
+            <a:avLst/>
+          </a:prstGeom>
+        </p:spPr>
+        <p:txBody>
+          <a:bodyPr wrap="square">
+            <a:spAutoFit/>
+          </a:bodyPr>
+          <a:lstStyle/>
+          <a:p>
+            <a:r>
+              <a:rPr lang="pt-BR" dirty="0">
+                <a:solidFill>
+                  <a:schemeClr val="bg1"/>
+                </a:solidFill>
+                <a:effectLst>
+                  <a:outerShdw blurRad="38100" dist="38100" dir="2700000" algn="tl">
+                    <a:srgbClr val="000000">
+                      <a:alpha val="43137"/>
+                    </a:srgbClr>
+                  </a:outerShdw>
+                </a:effectLst>
+                <a:latin typeface="Century Gothic" panose="020B0502020202020204" pitchFamily="34" charset="0"/>
+              </a:rPr>
+              <a:t>Trabalha ou já trabalhou (qualquer área)?</a:t>
+            </a:r>
+          </a:p>
+          <a:p>
+            <a:r>
+              <a:rPr lang="pt-BR" dirty="0">
+                <a:solidFill>
+                  <a:schemeClr val="bg1"/>
+                </a:solidFill>
+                <a:effectLst>
+                  <a:outerShdw blurRad="38100" dist="38100" dir="2700000" algn="tl">
+                    <a:srgbClr val="000000">
+                      <a:alpha val="43137"/>
+                    </a:srgbClr>
+                  </a:outerShdw>
+                </a:effectLst>
+                <a:latin typeface="Century Gothic" panose="020B0502020202020204" pitchFamily="34" charset="0"/>
+              </a:rPr>
+              <a:t>O que você está buscando com o curso?</a:t>
+            </a:r>
+          </a:p>
+        </p:txBody>
+      </p:sp>
+    </p:spTree>
+    <p:extLst>
+      <p:ext uri="{BB962C8B-B14F-4D97-AF65-F5344CB8AC3E}">
+        <p14:creationId xmlns:p14="http://schemas.microsoft.com/office/powerpoint/2010/main" val="4235332635"/>
+      </p:ext>
+    </p:extLst>
+  </p:cSld>
+  <p:clrMapOvr>
+    <a:masterClrMapping/>
+  </p:clrMapOvr>
+  <p:timing>
+    <p:tnLst>
+      <p:par>
+        <p:cTn id="1" dur="indefinite" restart="never" nodeType="tmRoot">
+          <p:childTnLst>
+            <p:seq concurrent="1" nextAc="seek">
+              <p:cTn id="2" dur="indefinite" nodeType="mainSeq">
+                <p:childTnLst>
+                  <p:par>
+                    <p:cTn id="3" fill="hold">
+                      <p:stCondLst>
+                        <p:cond delay="indefinite"/>
+                      </p:stCondLst>
+                      <p:childTnLst>
+                        <p:par>
+                          <p:cTn id="4" fill="hold">
+                            <p:stCondLst>
+                              <p:cond delay="0"/>
+                            </p:stCondLst>
+                            <p:childTnLst>
+                              <p:par>
+                                <p:cTn id="5" presetID="10" presetClass="entr" presetSubtype="0" fill="hold" grpId="0" nodeType="clickEffect">
+                                  <p:stCondLst>
+                                    <p:cond delay="0"/>
+                                  </p:stCondLst>
+                                  <p:childTnLst>
+                                    <p:set>
+                                      <p:cBhvr>
+                                        <p:cTn id="6" dur="1" fill="hold">
+                                          <p:stCondLst>
+                                            <p:cond delay="0"/>
+                                          </p:stCondLst>
+                                        </p:cTn>
+                                        <p:tgtEl>
+                                          <p:spTgt spid="3"/>
+                                        </p:tgtEl>
+                                        <p:attrNameLst>
+                                          <p:attrName>style.visibility</p:attrName>
+                                        </p:attrNameLst>
+                                      </p:cBhvr>
+                                      <p:to>
+                                        <p:strVal val="visible"/>
+                                      </p:to>
+                                    </p:set>
+                                    <p:animEffect transition="in" filter="fade">
+                                      <p:cBhvr>
+                                        <p:cTn id="7" dur="500"/>
+                                        <p:tgtEl>
+                                          <p:spTgt spid="3"/>
+                                        </p:tgtEl>
+                                      </p:cBhvr>
+                                    </p:animEffect>
+                                  </p:childTnLst>
+                                </p:cTn>
+                              </p:par>
+                            </p:childTnLst>
+                          </p:cTn>
+                        </p:par>
+                      </p:childTnLst>
+                    </p:cTn>
+                  </p:par>
+                  <p:par>
+                    <p:cTn id="8" fill="hold">
+                      <p:stCondLst>
+                        <p:cond delay="indefinite"/>
+                      </p:stCondLst>
+                      <p:childTnLst>
+                        <p:par>
+                          <p:cTn id="9" fill="hold">
+                            <p:stCondLst>
+                              <p:cond delay="0"/>
+                            </p:stCondLst>
+                            <p:childTnLst>
+                              <p:par>
+                                <p:cTn id="10" presetID="10" presetClass="entr" presetSubtype="0" fill="hold" grpId="0" nodeType="clickEffect">
+                                  <p:stCondLst>
+                                    <p:cond delay="0"/>
+                                  </p:stCondLst>
+                                  <p:childTnLst>
+                                    <p:set>
+                                      <p:cBhvr>
+                                        <p:cTn id="11" dur="1" fill="hold">
+                                          <p:stCondLst>
+                                            <p:cond delay="0"/>
+                                          </p:stCondLst>
+                                        </p:cTn>
+                                        <p:tgtEl>
+                                          <p:spTgt spid="4"/>
+                                        </p:tgtEl>
+                                        <p:attrNameLst>
+                                          <p:attrName>style.visibility</p:attrName>
+                                        </p:attrNameLst>
+                                      </p:cBhvr>
+                                      <p:to>
+                                        <p:strVal val="visible"/>
+                                      </p:to>
+                                    </p:set>
+                                    <p:animEffect transition="in" filter="fade">
+                                      <p:cBhvr>
+                                        <p:cTn id="12" dur="500"/>
+                                        <p:tgtEl>
+                                          <p:spTgt spid="4"/>
+                                        </p:tgtEl>
+                                      </p:cBhvr>
+                                    </p:animEffect>
+                                  </p:childTnLst>
+                                </p:cTn>
+                              </p:par>
+                            </p:childTnLst>
+                          </p:cTn>
+                        </p:par>
+                      </p:childTnLst>
+                    </p:cTn>
+                  </p:par>
+                </p:childTnLst>
+              </p:cTn>
+              <p:prevCondLst>
+                <p:cond evt="onPrev" delay="0">
+                  <p:tgtEl>
+                    <p:sldTgt/>
+                  </p:tgtEl>
+                </p:cond>
+              </p:prevCondLst>
+              <p:nextCondLst>
+                <p:cond evt="onNext" delay="0">
+                  <p:tgtEl>
+                    <p:sldTgt/>
+                  </p:tgtEl>
+                </p:cond>
+              </p:nextCondLst>
+            </p:seq>
+          </p:childTnLst>
+        </p:cTn>
+      </p:par>
+    </p:tnLst>
+    <p:bldLst>
+      <p:bldP spid="3" grpId="0"/>
+      <p:bldP spid="4" grpId="0"/>
+    </p:bldLst>
+  </p:timing>
+</p:sld>
+</file>
+
+<file path=ppt/slides/slide5.xml><?xml version="1.0" encoding="utf-8"?>
+<p:sld xmlns:a="http://schemas.openxmlformats.org/drawingml/2006/main" xmlns:r="http://schemas.openxmlformats.org/officeDocument/2006/relationships" xmlns:p="http://schemas.openxmlformats.org/presentationml/2006/main">
+  <p:cSld>
     <p:bg>
       <p:bgPr>
         <a:solidFill>
@@ -4485,10 +4791,10 @@
       </p:grpSpPr>
       <p:pic>
         <p:nvPicPr>
-          <p:cNvPr id="2052" name="Picture 4" descr="Imagem relacionada">
-            <a:extLst>
-              <a:ext uri="{FF2B5EF4-FFF2-40B4-BE49-F238E27FC236}">
-                <a16:creationId xmlns:a16="http://schemas.microsoft.com/office/drawing/2014/main" id="{69FC8329-55EB-4CC1-A6E9-C8F65E3C8678}"/>
+          <p:cNvPr id="2050" name="Picture 2" descr="Resultado de imagem para flat wallpaper programming">
+            <a:extLst>
+              <a:ext uri="{FF2B5EF4-FFF2-40B4-BE49-F238E27FC236}">
+                <a16:creationId xmlns:a16="http://schemas.microsoft.com/office/drawing/2014/main" id="{2A192297-A91B-42A2-A354-3F4D93B3CA59}"/>
               </a:ext>
             </a:extLst>
           </p:cNvPr>
@@ -4498,7 +4804,7 @@
           <p:nvPr/>
         </p:nvPicPr>
         <p:blipFill>
-          <a:blip r:embed="rId3">
+          <a:blip r:embed="rId2">
             <a:extLst>
               <a:ext uri="{28A0092B-C50C-407E-A947-70E740481C1C}">
                 <a14:useLocalDpi xmlns:a14="http://schemas.microsoft.com/office/drawing/2010/main" val="0"/>
@@ -4512,26 +4818,13 @@
         </p:blipFill>
         <p:spPr bwMode="auto">
           <a:xfrm>
-            <a:off x="2604652" y="1459923"/>
-            <a:ext cx="6918038" cy="3891397"/>
+            <a:off x="0" y="0"/>
+            <a:ext cx="12192000" cy="6650037"/>
           </a:xfrm>
           <a:prstGeom prst="rect">
             <a:avLst/>
           </a:prstGeom>
-          <a:ln w="38100" cap="sq">
-            <a:solidFill>
-              <a:srgbClr val="000000"/>
-            </a:solidFill>
-            <a:prstDash val="solid"/>
-            <a:miter lim="800000"/>
-          </a:ln>
-          <a:effectLst>
-            <a:outerShdw blurRad="50800" dist="38100" dir="2700000" algn="tl" rotWithShape="0">
-              <a:srgbClr val="000000">
-                <a:alpha val="43000"/>
-              </a:srgbClr>
-            </a:outerShdw>
-          </a:effectLst>
+          <a:noFill/>
           <a:extLst>
             <a:ext uri="{909E8E84-426E-40DD-AFC4-6F175D3DCCD1}">
               <a14:hiddenFill xmlns:a14="http://schemas.microsoft.com/office/drawing/2010/main">
@@ -4543,49 +4836,10 @@
           </a:extLst>
         </p:spPr>
       </p:pic>
-      <p:sp>
-        <p:nvSpPr>
-          <p:cNvPr id="2" name="CaixaDeTexto 1">
-            <a:extLst>
-              <a:ext uri="{FF2B5EF4-FFF2-40B4-BE49-F238E27FC236}">
-                <a16:creationId xmlns:a16="http://schemas.microsoft.com/office/drawing/2014/main" id="{F48A1F17-C043-4620-BA83-29FC3D9BEFD5}"/>
-              </a:ext>
-            </a:extLst>
-          </p:cNvPr>
-          <p:cNvSpPr txBox="1"/>
-          <p:nvPr/>
-        </p:nvSpPr>
-        <p:spPr>
-          <a:xfrm>
-            <a:off x="1662545" y="905164"/>
-            <a:ext cx="2381870" cy="369332"/>
-          </a:xfrm>
-          <a:prstGeom prst="rect">
-            <a:avLst/>
-          </a:prstGeom>
-          <a:noFill/>
-        </p:spPr>
-        <p:txBody>
-          <a:bodyPr wrap="none" rtlCol="0">
-            <a:spAutoFit/>
-          </a:bodyPr>
-          <a:lstStyle/>
-          <a:p>
-            <a:r>
-              <a:rPr lang="pt-BR" dirty="0">
-                <a:solidFill>
-                  <a:schemeClr val="bg1"/>
-                </a:solidFill>
-              </a:rPr>
-              <a:t>RASCUNHO QUALQUER</a:t>
-            </a:r>
-          </a:p>
-        </p:txBody>
-      </p:sp>
     </p:spTree>
     <p:extLst>
       <p:ext uri="{BB962C8B-B14F-4D97-AF65-F5344CB8AC3E}">
-        <p14:creationId xmlns:p14="http://schemas.microsoft.com/office/powerpoint/2010/main" val="1473910187"/>
+        <p14:creationId xmlns:p14="http://schemas.microsoft.com/office/powerpoint/2010/main" val="1757380687"/>
       </p:ext>
     </p:extLst>
   </p:cSld>
@@ -4595,7 +4849,7 @@
 </p:sld>
 </file>
 
-<file path=ppt/slides/slide5.xml><?xml version="1.0" encoding="utf-8"?>
+<file path=ppt/slides/slide6.xml><?xml version="1.0" encoding="utf-8"?>
 <p:sld xmlns:a="http://schemas.openxmlformats.org/drawingml/2006/main" xmlns:r="http://schemas.openxmlformats.org/officeDocument/2006/relationships" xmlns:p="http://schemas.openxmlformats.org/presentationml/2006/main">
   <p:cSld>
     <p:spTree>

</xml_diff>